<commit_message>
Shivani's presentation + slides about data flow
</commit_message>
<xml_diff>
--- a/presentations/housing research_190816_plus_flow.pptx
+++ b/presentations/housing research_190816_plus_flow.pptx
@@ -251,7 +251,7 @@
             <a:fld id="{13A00ACC-A12A-4DA4-940E-58D69F363DA2}" type="datetimeFigureOut">
               <a:rPr lang="en-CA" smtClean="0"/>
               <a:pPr/>
-              <a:t>2019-08-16</a:t>
+              <a:t>2019-08-19</a:t>
             </a:fld>
             <a:endParaRPr lang="en-CA"/>
           </a:p>
@@ -418,7 +418,7 @@
             <a:fld id="{6D09EA6E-6DDA-48CC-9ABE-09439E9F3133}" type="datetimeFigureOut">
               <a:rPr lang="en-CA" smtClean="0"/>
               <a:pPr/>
-              <a:t>2019-08-16</a:t>
+              <a:t>2019-08-19</a:t>
             </a:fld>
             <a:endParaRPr lang="en-CA"/>
           </a:p>
@@ -986,7 +986,7 @@
           <a:p>
             <a:fld id="{62DA4C3D-2350-4791-AEDD-D231F8E7CF54}" type="datetime1">
               <a:rPr lang="en-CA" smtClean="0"/>
-              <a:t>2019-08-16</a:t>
+              <a:t>2019-08-19</a:t>
             </a:fld>
             <a:endParaRPr lang="en-CA" dirty="0"/>
           </a:p>
@@ -1179,7 +1179,7 @@
           <a:p>
             <a:fld id="{389B70EE-28A2-4907-B296-801F25783F68}" type="datetime1">
               <a:rPr lang="en-CA" smtClean="0"/>
-              <a:t>2019-08-16</a:t>
+              <a:t>2019-08-19</a:t>
             </a:fld>
             <a:endParaRPr lang="en-CA"/>
           </a:p>
@@ -1371,7 +1371,7 @@
           <a:p>
             <a:fld id="{0153B5B8-7667-4865-8256-A1AA6DCDB1E6}" type="datetime1">
               <a:rPr lang="en-CA" smtClean="0"/>
-              <a:t>2019-08-16</a:t>
+              <a:t>2019-08-19</a:t>
             </a:fld>
             <a:endParaRPr lang="en-CA"/>
           </a:p>
@@ -1686,7 +1686,7 @@
           <a:p>
             <a:fld id="{4FD80E81-B433-44FB-A1BF-84930E6D82E7}" type="datetime1">
               <a:rPr lang="en-CA" smtClean="0"/>
-              <a:t>2019-08-16</a:t>
+              <a:t>2019-08-19</a:t>
             </a:fld>
             <a:endParaRPr lang="en-CA"/>
           </a:p>
@@ -5653,7 +5653,13 @@
               <a:rPr lang="en-CA" sz="2800" b="1" dirty="0">
                 <a:latin typeface="Calibri" panose="020F0502020204030204" pitchFamily="34" charset="0"/>
               </a:rPr>
-              <a:t>Data Flow for Teranet prep</a:t>
+              <a:t>Data Flow for </a:t>
+            </a:r>
+            <a:r>
+              <a:rPr lang="en-CA" sz="2800" b="1">
+                <a:latin typeface="Calibri" panose="020F0502020204030204" pitchFamily="34" charset="0"/>
+              </a:rPr>
+              <a:t>Teranet prep</a:t>
             </a:r>
             <a:endParaRPr lang="en-CA" sz="2800" b="1" dirty="0"/>
           </a:p>

</xml_diff>